<commit_message>
update_BERT: Pre-training of Deep Bidirectional Transformers for Language Understanding
</commit_message>
<xml_diff>
--- a/Base_Model/LLM/论文插图.pptx
+++ b/Base_Model/LLM/论文插图.pptx
@@ -8,11 +8,13 @@
     <p:notesMasterId r:id="rId4"/>
   </p:notesMasterIdLst>
   <p:handoutMasterIdLst>
-    <p:handoutMasterId r:id="rId6"/>
+    <p:handoutMasterId r:id="rId8"/>
   </p:handoutMasterIdLst>
   <p:sldIdLst>
     <p:sldId id="256" r:id="rId3"/>
     <p:sldId id="257" r:id="rId5"/>
+    <p:sldId id="258" r:id="rId6"/>
+    <p:sldId id="259" r:id="rId7"/>
   </p:sldIdLst>
   <p:sldSz cx="12192000" cy="6858000"/>
   <p:notesSz cx="7103745" cy="10234295"/>
@@ -114,7 +116,7 @@
   <p:extLst>
     <p:ext uri="{EFAFB233-063F-42B5-8137-9DF3F51BA10A}">
       <p15:sldGuideLst xmlns:p15="http://schemas.microsoft.com/office/powerpoint/2012/main">
-        <p15:guide id="1" orient="horz" pos="2146" userDrawn="1">
+        <p15:guide id="1" orient="horz" pos="2117" userDrawn="1">
           <p15:clr>
             <a:srgbClr val="A4A3A4"/>
           </p15:clr>
@@ -4675,6 +4677,1686 @@
           </a:p>
         </p:txBody>
       </p:sp>
+      <p:pic>
+        <p:nvPicPr>
+          <p:cNvPr id="21" name="图片 20"/>
+          <p:cNvPicPr>
+            <a:picLocks noChangeAspect="1"/>
+          </p:cNvPicPr>
+          <p:nvPr>
+            <p:custDataLst>
+              <p:tags r:id="rId20"/>
+            </p:custDataLst>
+          </p:nvPr>
+        </p:nvPicPr>
+        <p:blipFill>
+          <a:blip r:embed="rId21"/>
+          <a:stretch>
+            <a:fillRect/>
+          </a:stretch>
+        </p:blipFill>
+        <p:spPr>
+          <a:xfrm>
+            <a:off x="4333875" y="6229350"/>
+            <a:ext cx="3749040" cy="621665"/>
+          </a:xfrm>
+          <a:prstGeom prst="rect">
+            <a:avLst/>
+          </a:prstGeom>
+        </p:spPr>
+      </p:pic>
+      <p:pic>
+        <p:nvPicPr>
+          <p:cNvPr id="23" name="图片 22"/>
+          <p:cNvPicPr>
+            <a:picLocks noChangeAspect="1"/>
+          </p:cNvPicPr>
+          <p:nvPr>
+            <p:custDataLst>
+              <p:tags r:id="rId22"/>
+            </p:custDataLst>
+          </p:nvPr>
+        </p:nvPicPr>
+        <p:blipFill>
+          <a:blip r:embed="rId23"/>
+          <a:stretch>
+            <a:fillRect/>
+          </a:stretch>
+        </p:blipFill>
+        <p:spPr>
+          <a:xfrm>
+            <a:off x="8884920" y="5840095"/>
+            <a:ext cx="2874010" cy="603250"/>
+          </a:xfrm>
+          <a:prstGeom prst="rect">
+            <a:avLst/>
+          </a:prstGeom>
+        </p:spPr>
+      </p:pic>
+      <p:pic>
+        <p:nvPicPr>
+          <p:cNvPr id="24" name="图片 23"/>
+          <p:cNvPicPr>
+            <a:picLocks noChangeAspect="1"/>
+          </p:cNvPicPr>
+          <p:nvPr>
+            <p:custDataLst>
+              <p:tags r:id="rId24"/>
+            </p:custDataLst>
+          </p:nvPr>
+        </p:nvPicPr>
+        <p:blipFill>
+          <a:blip r:embed="rId25"/>
+          <a:stretch>
+            <a:fillRect/>
+          </a:stretch>
+        </p:blipFill>
+        <p:spPr>
+          <a:xfrm>
+            <a:off x="8884920" y="6362065"/>
+            <a:ext cx="2785110" cy="501015"/>
+          </a:xfrm>
+          <a:prstGeom prst="rect">
+            <a:avLst/>
+          </a:prstGeom>
+        </p:spPr>
+      </p:pic>
+      <p:sp>
+        <p:nvSpPr>
+          <p:cNvPr id="25" name="文本框 24"/>
+          <p:cNvSpPr txBox="1"/>
+          <p:nvPr>
+            <p:custDataLst>
+              <p:tags r:id="rId26"/>
+            </p:custDataLst>
+          </p:nvPr>
+        </p:nvSpPr>
+        <p:spPr>
+          <a:xfrm>
+            <a:off x="3634105" y="5766435"/>
+            <a:ext cx="5148580" cy="462915"/>
+          </a:xfrm>
+          <a:prstGeom prst="rect">
+            <a:avLst/>
+          </a:prstGeom>
+          <a:noFill/>
+        </p:spPr>
+        <p:txBody>
+          <a:bodyPr wrap="square" rtlCol="0">
+            <a:noAutofit/>
+          </a:bodyPr>
+          <a:p>
+            <a:pPr algn="ctr"/>
+            <a:r>
+              <a:rPr lang="zh-CN" altLang="en-US" sz="1000" b="1">
+                <a:latin typeface="微软雅黑" charset="0"/>
+                <a:ea typeface="微软雅黑" charset="0"/>
+                <a:cs typeface="微软雅黑" charset="0"/>
+              </a:rPr>
+              <a:t>无监督预训练损失</a:t>
+            </a:r>
+            <a:br>
+              <a:rPr lang="zh-CN" altLang="en-US" sz="1000" b="1">
+                <a:latin typeface="微软雅黑" charset="0"/>
+                <a:ea typeface="微软雅黑" charset="0"/>
+                <a:cs typeface="微软雅黑" charset="0"/>
+              </a:rPr>
+            </a:br>
+            <a:r>
+              <a:rPr lang="zh-CN" altLang="en-US" sz="1000" b="1">
+                <a:latin typeface="微软雅黑" charset="0"/>
+                <a:ea typeface="微软雅黑" charset="0"/>
+                <a:cs typeface="微软雅黑" charset="0"/>
+              </a:rPr>
+              <a:t>通过前</a:t>
+            </a:r>
+            <a:r>
+              <a:rPr lang="en-US" altLang="zh-CN" sz="1000" b="1">
+                <a:latin typeface="微软雅黑" charset="0"/>
+                <a:ea typeface="微软雅黑" charset="0"/>
+                <a:cs typeface="微软雅黑" charset="0"/>
+              </a:rPr>
+              <a:t>k</a:t>
+            </a:r>
+            <a:r>
+              <a:rPr lang="zh-CN" altLang="en-US" sz="1000" b="1">
+                <a:latin typeface="微软雅黑" charset="0"/>
+                <a:ea typeface="微软雅黑" charset="0"/>
+                <a:cs typeface="微软雅黑" charset="0"/>
+              </a:rPr>
+              <a:t>个单词预测当前正确单词的概率</a:t>
+            </a:r>
+            <a:br>
+              <a:rPr lang="zh-CN" altLang="en-US" sz="1000" b="1">
+                <a:latin typeface="微软雅黑" charset="0"/>
+                <a:ea typeface="微软雅黑" charset="0"/>
+                <a:cs typeface="微软雅黑" charset="0"/>
+              </a:rPr>
+            </a:br>
+            <a:r>
+              <a:rPr lang="zh-CN" altLang="en-US" sz="1000" b="1">
+                <a:latin typeface="微软雅黑" charset="0"/>
+                <a:ea typeface="微软雅黑" charset="0"/>
+                <a:cs typeface="微软雅黑" charset="0"/>
+              </a:rPr>
+              <a:t>加权求和每一个单词的</a:t>
+            </a:r>
+            <a:r>
+              <a:rPr lang="zh-CN" altLang="en-US" sz="1000" b="1">
+                <a:latin typeface="微软雅黑" charset="0"/>
+                <a:ea typeface="微软雅黑" charset="0"/>
+                <a:cs typeface="微软雅黑" charset="0"/>
+              </a:rPr>
+              <a:t>概率</a:t>
+            </a:r>
+            <a:endParaRPr lang="zh-CN" altLang="en-US" sz="1000" b="1">
+              <a:latin typeface="微软雅黑" charset="0"/>
+              <a:ea typeface="微软雅黑" charset="0"/>
+              <a:cs typeface="微软雅黑" charset="0"/>
+            </a:endParaRPr>
+          </a:p>
+        </p:txBody>
+      </p:sp>
+      <p:sp>
+        <p:nvSpPr>
+          <p:cNvPr id="26" name="文本框 25"/>
+          <p:cNvSpPr txBox="1"/>
+          <p:nvPr>
+            <p:custDataLst>
+              <p:tags r:id="rId27"/>
+            </p:custDataLst>
+          </p:nvPr>
+        </p:nvSpPr>
+        <p:spPr>
+          <a:xfrm>
+            <a:off x="7747635" y="5414010"/>
+            <a:ext cx="5148580" cy="462915"/>
+          </a:xfrm>
+          <a:prstGeom prst="rect">
+            <a:avLst/>
+          </a:prstGeom>
+          <a:noFill/>
+        </p:spPr>
+        <p:txBody>
+          <a:bodyPr wrap="square" rtlCol="0">
+            <a:noAutofit/>
+          </a:bodyPr>
+          <a:p>
+            <a:pPr algn="ctr"/>
+            <a:r>
+              <a:rPr lang="zh-CN" altLang="en-US" sz="1000" b="1">
+                <a:latin typeface="微软雅黑" charset="0"/>
+                <a:ea typeface="微软雅黑" charset="0"/>
+                <a:cs typeface="微软雅黑" charset="0"/>
+              </a:rPr>
+              <a:t>监督微调损失</a:t>
+            </a:r>
+            <a:br>
+              <a:rPr lang="zh-CN" altLang="en-US" sz="1000" b="1">
+                <a:latin typeface="微软雅黑" charset="0"/>
+                <a:ea typeface="微软雅黑" charset="0"/>
+                <a:cs typeface="微软雅黑" charset="0"/>
+              </a:rPr>
+            </a:br>
+            <a:r>
+              <a:rPr lang="zh-CN" altLang="en-US" sz="1000" b="1">
+                <a:latin typeface="微软雅黑" charset="0"/>
+                <a:ea typeface="微软雅黑" charset="0"/>
+                <a:cs typeface="微软雅黑" charset="0"/>
+              </a:rPr>
+              <a:t>人工标注的置信度和模型预测的概率</a:t>
+            </a:r>
+            <a:br>
+              <a:rPr lang="zh-CN" altLang="en-US" sz="1000" b="1">
+                <a:latin typeface="微软雅黑" charset="0"/>
+                <a:ea typeface="微软雅黑" charset="0"/>
+                <a:cs typeface="微软雅黑" charset="0"/>
+              </a:rPr>
+            </a:br>
+            <a:r>
+              <a:rPr lang="zh-CN" altLang="en-US" sz="1000" b="1">
+                <a:latin typeface="微软雅黑" charset="0"/>
+                <a:ea typeface="微软雅黑" charset="0"/>
+                <a:cs typeface="微软雅黑" charset="0"/>
+              </a:rPr>
+              <a:t>融合无监督损失，𝜆</a:t>
+            </a:r>
+            <a:r>
+              <a:rPr lang="en-US" altLang="zh-CN" sz="1000" b="1">
+                <a:latin typeface="微软雅黑" charset="0"/>
+                <a:ea typeface="微软雅黑" charset="0"/>
+                <a:cs typeface="微软雅黑" charset="0"/>
+              </a:rPr>
+              <a:t>=0.5</a:t>
+            </a:r>
+            <a:endParaRPr lang="en-US" altLang="zh-CN" sz="1000" b="1">
+              <a:latin typeface="微软雅黑" charset="0"/>
+              <a:ea typeface="微软雅黑" charset="0"/>
+              <a:cs typeface="微软雅黑" charset="0"/>
+            </a:endParaRPr>
+          </a:p>
+        </p:txBody>
+      </p:sp>
+      <p:sp>
+        <p:nvSpPr>
+          <p:cNvPr id="27" name="矩形: 圆角 36"/>
+          <p:cNvSpPr/>
+          <p:nvPr>
+            <p:custDataLst>
+              <p:tags r:id="rId28"/>
+            </p:custDataLst>
+          </p:nvPr>
+        </p:nvSpPr>
+        <p:spPr>
+          <a:xfrm rot="10800000" flipV="1">
+            <a:off x="4333875" y="5630545"/>
+            <a:ext cx="3748405" cy="1232535"/>
+          </a:xfrm>
+          <a:prstGeom prst="roundRect">
+            <a:avLst>
+              <a:gd name="adj" fmla="val 10039"/>
+            </a:avLst>
+          </a:prstGeom>
+          <a:noFill/>
+          <a:ln w="38100">
+            <a:solidFill>
+              <a:schemeClr val="tx1"/>
+            </a:solidFill>
+            <a:prstDash val="lgDash"/>
+          </a:ln>
+        </p:spPr>
+        <p:style>
+          <a:lnRef idx="2">
+            <a:schemeClr val="accent1">
+              <a:shade val="15000"/>
+            </a:schemeClr>
+          </a:lnRef>
+          <a:fillRef idx="1">
+            <a:schemeClr val="accent1"/>
+          </a:fillRef>
+          <a:effectRef idx="0">
+            <a:schemeClr val="accent1"/>
+          </a:effectRef>
+          <a:fontRef idx="minor">
+            <a:schemeClr val="lt1"/>
+          </a:fontRef>
+        </p:style>
+        <p:txBody>
+          <a:bodyPr rtlCol="0" anchor="ctr"/>
+          <a:p>
+            <a:pPr algn="ctr"/>
+            <a:endParaRPr lang="zh-CN" altLang="en-US"/>
+          </a:p>
+        </p:txBody>
+      </p:sp>
+      <p:sp>
+        <p:nvSpPr>
+          <p:cNvPr id="28" name="矩形: 圆角 36"/>
+          <p:cNvSpPr/>
+          <p:nvPr>
+            <p:custDataLst>
+              <p:tags r:id="rId29"/>
+            </p:custDataLst>
+          </p:nvPr>
+        </p:nvSpPr>
+        <p:spPr>
+          <a:xfrm rot="10800000" flipV="1">
+            <a:off x="8782685" y="5391150"/>
+            <a:ext cx="3048635" cy="1431290"/>
+          </a:xfrm>
+          <a:prstGeom prst="roundRect">
+            <a:avLst>
+              <a:gd name="adj" fmla="val 10039"/>
+            </a:avLst>
+          </a:prstGeom>
+          <a:noFill/>
+          <a:ln w="38100">
+            <a:solidFill>
+              <a:schemeClr val="tx1"/>
+            </a:solidFill>
+            <a:prstDash val="lgDash"/>
+          </a:ln>
+        </p:spPr>
+        <p:style>
+          <a:lnRef idx="2">
+            <a:schemeClr val="accent1">
+              <a:shade val="15000"/>
+            </a:schemeClr>
+          </a:lnRef>
+          <a:fillRef idx="1">
+            <a:schemeClr val="accent1"/>
+          </a:fillRef>
+          <a:effectRef idx="0">
+            <a:schemeClr val="accent1"/>
+          </a:effectRef>
+          <a:fontRef idx="minor">
+            <a:schemeClr val="lt1"/>
+          </a:fontRef>
+        </p:style>
+        <p:txBody>
+          <a:bodyPr rtlCol="0" anchor="ctr"/>
+          <a:p>
+            <a:pPr algn="ctr"/>
+            <a:endParaRPr lang="zh-CN" altLang="en-US"/>
+          </a:p>
+        </p:txBody>
+      </p:sp>
+    </p:spTree>
+  </p:cSld>
+  <p:clrMapOvr>
+    <a:masterClrMapping/>
+  </p:clrMapOvr>
+</p:sld>
+</file>
+
+<file path=ppt/slides/slide3.xml><?xml version="1.0" encoding="utf-8"?>
+<p:sld xmlns:a="http://schemas.openxmlformats.org/drawingml/2006/main" xmlns:r="http://schemas.openxmlformats.org/officeDocument/2006/relationships" xmlns:p="http://schemas.openxmlformats.org/presentationml/2006/main">
+  <p:cSld>
+    <p:spTree>
+      <p:nvGrpSpPr>
+        <p:cNvPr id="1" name=""/>
+        <p:cNvGrpSpPr/>
+        <p:nvPr/>
+      </p:nvGrpSpPr>
+      <p:grpSpPr/>
+      <p:sp>
+        <p:nvSpPr>
+          <p:cNvPr id="2" name="标题 1"/>
+          <p:cNvSpPr>
+            <a:spLocks noGrp="1"/>
+          </p:cNvSpPr>
+          <p:nvPr>
+            <p:ph type="ctrTitle"/>
+          </p:nvPr>
+        </p:nvSpPr>
+        <p:spPr/>
+        <p:txBody>
+          <a:bodyPr/>
+          <a:p>
+            <a:r>
+              <a:rPr lang="en-US" altLang="zh-CN"/>
+              <a:t>BERT</a:t>
+            </a:r>
+            <a:endParaRPr lang="en-US" altLang="zh-CN"/>
+          </a:p>
+        </p:txBody>
+      </p:sp>
+      <p:sp>
+        <p:nvSpPr>
+          <p:cNvPr id="3" name="副标题 2"/>
+          <p:cNvSpPr>
+            <a:spLocks noGrp="1"/>
+          </p:cNvSpPr>
+          <p:nvPr>
+            <p:ph type="subTitle" idx="1"/>
+          </p:nvPr>
+        </p:nvSpPr>
+        <p:spPr/>
+        <p:txBody>
+          <a:bodyPr/>
+          <a:p>
+            <a:endParaRPr lang="zh-CN" altLang="en-US"/>
+          </a:p>
+        </p:txBody>
+      </p:sp>
+    </p:spTree>
+  </p:cSld>
+  <p:clrMapOvr>
+    <a:masterClrMapping/>
+  </p:clrMapOvr>
+</p:sld>
+</file>
+
+<file path=ppt/slides/slide4.xml><?xml version="1.0" encoding="utf-8"?>
+<p:sld xmlns:a="http://schemas.openxmlformats.org/drawingml/2006/main" xmlns:r="http://schemas.openxmlformats.org/officeDocument/2006/relationships" xmlns:p="http://schemas.openxmlformats.org/presentationml/2006/main">
+  <p:cSld>
+    <p:spTree>
+      <p:nvGrpSpPr>
+        <p:cNvPr id="1" name=""/>
+        <p:cNvGrpSpPr/>
+        <p:nvPr/>
+      </p:nvGrpSpPr>
+      <p:grpSpPr/>
+      <p:pic>
+        <p:nvPicPr>
+          <p:cNvPr id="4" name="图片 3"/>
+          <p:cNvPicPr>
+            <a:picLocks noChangeAspect="1"/>
+          </p:cNvPicPr>
+          <p:nvPr>
+            <p:custDataLst>
+              <p:tags r:id="rId1"/>
+            </p:custDataLst>
+          </p:nvPr>
+        </p:nvPicPr>
+        <p:blipFill>
+          <a:blip r:embed="rId2"/>
+          <a:stretch>
+            <a:fillRect/>
+          </a:stretch>
+        </p:blipFill>
+        <p:spPr>
+          <a:xfrm>
+            <a:off x="135255" y="305435"/>
+            <a:ext cx="10755630" cy="4464685"/>
+          </a:xfrm>
+          <a:prstGeom prst="rect">
+            <a:avLst/>
+          </a:prstGeom>
+        </p:spPr>
+      </p:pic>
+      <p:pic>
+        <p:nvPicPr>
+          <p:cNvPr id="5" name="图片 4"/>
+          <p:cNvPicPr>
+            <a:picLocks noChangeAspect="1"/>
+          </p:cNvPicPr>
+          <p:nvPr>
+            <p:custDataLst>
+              <p:tags r:id="rId3"/>
+            </p:custDataLst>
+          </p:nvPr>
+        </p:nvPicPr>
+        <p:blipFill>
+          <a:blip r:embed="rId4"/>
+          <a:stretch>
+            <a:fillRect/>
+          </a:stretch>
+        </p:blipFill>
+        <p:spPr>
+          <a:xfrm>
+            <a:off x="354965" y="4770120"/>
+            <a:ext cx="4642485" cy="1506220"/>
+          </a:xfrm>
+          <a:prstGeom prst="rect">
+            <a:avLst/>
+          </a:prstGeom>
+        </p:spPr>
+      </p:pic>
+      <p:pic>
+        <p:nvPicPr>
+          <p:cNvPr id="6" name="图片 5"/>
+          <p:cNvPicPr>
+            <a:picLocks noChangeAspect="1"/>
+          </p:cNvPicPr>
+          <p:nvPr>
+            <p:custDataLst>
+              <p:tags r:id="rId5"/>
+            </p:custDataLst>
+          </p:nvPr>
+        </p:nvPicPr>
+        <p:blipFill>
+          <a:blip r:embed="rId6"/>
+          <a:stretch>
+            <a:fillRect/>
+          </a:stretch>
+        </p:blipFill>
+        <p:spPr>
+          <a:xfrm>
+            <a:off x="5273040" y="4915535"/>
+            <a:ext cx="3416935" cy="1815465"/>
+          </a:xfrm>
+          <a:prstGeom prst="rect">
+            <a:avLst/>
+          </a:prstGeom>
+        </p:spPr>
+      </p:pic>
+      <p:pic>
+        <p:nvPicPr>
+          <p:cNvPr id="7" name="图片 6"/>
+          <p:cNvPicPr>
+            <a:picLocks noChangeAspect="1"/>
+          </p:cNvPicPr>
+          <p:nvPr>
+            <p:custDataLst>
+              <p:tags r:id="rId7"/>
+            </p:custDataLst>
+          </p:nvPr>
+        </p:nvPicPr>
+        <p:blipFill>
+          <a:blip r:embed="rId8"/>
+          <a:stretch>
+            <a:fillRect/>
+          </a:stretch>
+        </p:blipFill>
+        <p:spPr>
+          <a:xfrm>
+            <a:off x="9121775" y="4514850"/>
+            <a:ext cx="2931160" cy="2343150"/>
+          </a:xfrm>
+          <a:prstGeom prst="rect">
+            <a:avLst/>
+          </a:prstGeom>
+        </p:spPr>
+      </p:pic>
+      <p:sp>
+        <p:nvSpPr>
+          <p:cNvPr id="22" name="文本框 21"/>
+          <p:cNvSpPr txBox="1"/>
+          <p:nvPr>
+            <p:custDataLst>
+              <p:tags r:id="rId9"/>
+            </p:custDataLst>
+          </p:nvPr>
+        </p:nvSpPr>
+        <p:spPr>
+          <a:xfrm>
+            <a:off x="-73025" y="6176010"/>
+            <a:ext cx="5346065" cy="742315"/>
+          </a:xfrm>
+          <a:prstGeom prst="rect">
+            <a:avLst/>
+          </a:prstGeom>
+          <a:noFill/>
+        </p:spPr>
+        <p:txBody>
+          <a:bodyPr wrap="square" rtlCol="0">
+            <a:noAutofit/>
+          </a:bodyPr>
+          <a:p>
+            <a:pPr algn="ctr"/>
+            <a:r>
+              <a:rPr lang="en-US" altLang="zh-CN" sz="1200" b="1">
+                <a:latin typeface="微软雅黑" charset="0"/>
+                <a:ea typeface="微软雅黑" charset="0"/>
+                <a:cs typeface="微软雅黑" charset="0"/>
+              </a:rPr>
+              <a:t>BERT</a:t>
+            </a:r>
+            <a:r>
+              <a:rPr lang="zh-CN" altLang="en-US" sz="1200" b="1">
+                <a:latin typeface="微软雅黑" charset="0"/>
+                <a:ea typeface="微软雅黑" charset="0"/>
+                <a:cs typeface="微软雅黑" charset="0"/>
+              </a:rPr>
+              <a:t>输入的是两个被遮掩的句子</a:t>
+            </a:r>
+            <a:br>
+              <a:rPr lang="zh-CN" altLang="en-US" sz="1200" b="1">
+                <a:latin typeface="微软雅黑" charset="0"/>
+                <a:ea typeface="微软雅黑" charset="0"/>
+                <a:cs typeface="微软雅黑" charset="0"/>
+              </a:rPr>
+            </a:br>
+            <a:r>
+              <a:rPr lang="en-US" altLang="zh-CN" sz="1200" b="1">
+                <a:latin typeface="微软雅黑" charset="0"/>
+                <a:ea typeface="微软雅黑" charset="0"/>
+                <a:cs typeface="微软雅黑" charset="0"/>
+              </a:rPr>
+              <a:t>1. </a:t>
+            </a:r>
+            <a:r>
+              <a:rPr lang="zh-CN" altLang="en-US" sz="1200" b="1">
+                <a:latin typeface="微软雅黑" charset="0"/>
+                <a:ea typeface="微软雅黑" charset="0"/>
+                <a:cs typeface="微软雅黑" charset="0"/>
+              </a:rPr>
+              <a:t>在输入的句子中随机选择</a:t>
+            </a:r>
+            <a:r>
+              <a:rPr lang="en-US" altLang="zh-CN" sz="1200" b="1">
+                <a:latin typeface="微软雅黑" charset="0"/>
+                <a:ea typeface="微软雅黑" charset="0"/>
+                <a:cs typeface="微软雅黑" charset="0"/>
+              </a:rPr>
+              <a:t>15%</a:t>
+            </a:r>
+            <a:r>
+              <a:rPr lang="zh-CN" altLang="en-US" sz="1200" b="1">
+                <a:latin typeface="微软雅黑" charset="0"/>
+                <a:ea typeface="微软雅黑" charset="0"/>
+                <a:cs typeface="微软雅黑" charset="0"/>
+              </a:rPr>
+              <a:t>的句子进行特殊处理，详见最右图</a:t>
+            </a:r>
+            <a:br>
+              <a:rPr lang="zh-CN" altLang="en-US" sz="1200" b="1">
+                <a:latin typeface="微软雅黑" charset="0"/>
+                <a:ea typeface="微软雅黑" charset="0"/>
+                <a:cs typeface="微软雅黑" charset="0"/>
+              </a:rPr>
+            </a:br>
+            <a:r>
+              <a:rPr lang="en-US" altLang="zh-CN" sz="1200" b="1">
+                <a:latin typeface="微软雅黑" charset="0"/>
+                <a:ea typeface="微软雅黑" charset="0"/>
+                <a:cs typeface="微软雅黑" charset="0"/>
+              </a:rPr>
+              <a:t>2. </a:t>
+            </a:r>
+            <a:r>
+              <a:rPr lang="zh-CN" altLang="en-US" sz="1200" b="1">
+                <a:latin typeface="微软雅黑" charset="0"/>
+                <a:ea typeface="微软雅黑" charset="0"/>
+                <a:cs typeface="微软雅黑" charset="0"/>
+              </a:rPr>
+              <a:t>从数据集中随机抽取两个句子，并判断是否相邻，详见</a:t>
+            </a:r>
+            <a:r>
+              <a:rPr lang="zh-CN" altLang="en-US" sz="1200" b="1">
+                <a:latin typeface="微软雅黑" charset="0"/>
+                <a:ea typeface="微软雅黑" charset="0"/>
+                <a:cs typeface="微软雅黑" charset="0"/>
+              </a:rPr>
+              <a:t>右侧</a:t>
+            </a:r>
+            <a:endParaRPr lang="zh-CN" altLang="en-US" sz="1200" b="1">
+              <a:latin typeface="微软雅黑" charset="0"/>
+              <a:ea typeface="微软雅黑" charset="0"/>
+              <a:cs typeface="微软雅黑" charset="0"/>
+            </a:endParaRPr>
+          </a:p>
+        </p:txBody>
+      </p:sp>
+      <p:sp>
+        <p:nvSpPr>
+          <p:cNvPr id="8" name="文本框 7"/>
+          <p:cNvSpPr txBox="1"/>
+          <p:nvPr>
+            <p:custDataLst>
+              <p:tags r:id="rId10"/>
+            </p:custDataLst>
+          </p:nvPr>
+        </p:nvSpPr>
+        <p:spPr>
+          <a:xfrm>
+            <a:off x="5152390" y="0"/>
+            <a:ext cx="7039610" cy="742315"/>
+          </a:xfrm>
+          <a:prstGeom prst="rect">
+            <a:avLst/>
+          </a:prstGeom>
+          <a:noFill/>
+        </p:spPr>
+        <p:txBody>
+          <a:bodyPr wrap="square" rtlCol="0">
+            <a:noAutofit/>
+          </a:bodyPr>
+          <a:p>
+            <a:pPr algn="ctr"/>
+            <a:r>
+              <a:rPr lang="zh-CN" altLang="en-US" sz="2000" b="1">
+                <a:latin typeface="微软雅黑" charset="0"/>
+                <a:ea typeface="微软雅黑" charset="0"/>
+                <a:cs typeface="微软雅黑" charset="0"/>
+              </a:rPr>
+              <a:t>使用</a:t>
+            </a:r>
+            <a:r>
+              <a:rPr lang="en-US" altLang="zh-CN" sz="2000" b="1">
+                <a:latin typeface="微软雅黑" charset="0"/>
+                <a:ea typeface="微软雅黑" charset="0"/>
+                <a:cs typeface="微软雅黑" charset="0"/>
+              </a:rPr>
+              <a:t>Transformer encoder</a:t>
+            </a:r>
+            <a:r>
+              <a:rPr lang="zh-CN" altLang="en-US" sz="2000" b="1">
+                <a:solidFill>
+                  <a:srgbClr val="FF0000"/>
+                </a:solidFill>
+                <a:latin typeface="微软雅黑" charset="0"/>
+                <a:ea typeface="微软雅黑" charset="0"/>
+                <a:cs typeface="微软雅黑" charset="0"/>
+              </a:rPr>
+              <a:t>双向学习</a:t>
+            </a:r>
+            <a:r>
+              <a:rPr lang="zh-CN" altLang="en-US" sz="2000" b="1">
+                <a:latin typeface="微软雅黑" charset="0"/>
+                <a:ea typeface="微软雅黑" charset="0"/>
+                <a:cs typeface="微软雅黑" charset="0"/>
+              </a:rPr>
+              <a:t>句子的语义</a:t>
+            </a:r>
+            <a:br>
+              <a:rPr lang="zh-CN" altLang="en-US" sz="2000" b="1">
+                <a:latin typeface="微软雅黑" charset="0"/>
+                <a:ea typeface="微软雅黑" charset="0"/>
+                <a:cs typeface="微软雅黑" charset="0"/>
+              </a:rPr>
+            </a:br>
+            <a:r>
+              <a:rPr lang="zh-CN" altLang="en-US" sz="2000" b="1">
+                <a:latin typeface="微软雅黑" charset="0"/>
+                <a:ea typeface="微软雅黑" charset="0"/>
+                <a:cs typeface="微软雅黑" charset="0"/>
+              </a:rPr>
+              <a:t>预训练</a:t>
+            </a:r>
+            <a:r>
+              <a:rPr lang="zh-CN" altLang="en-US" sz="2000" b="1">
+                <a:latin typeface="微软雅黑" charset="0"/>
+                <a:ea typeface="微软雅黑" charset="0"/>
+                <a:cs typeface="微软雅黑" charset="0"/>
+              </a:rPr>
+              <a:t>部分两个任务</a:t>
+            </a:r>
+            <a:r>
+              <a:rPr lang="en-US" altLang="zh-CN" sz="2000" b="1">
+                <a:latin typeface="微软雅黑" charset="0"/>
+                <a:ea typeface="微软雅黑" charset="0"/>
+                <a:cs typeface="微软雅黑" charset="0"/>
+              </a:rPr>
+              <a:t>1.</a:t>
+            </a:r>
+            <a:r>
+              <a:rPr lang="zh-CN" altLang="en-US" sz="2000" b="1">
+                <a:latin typeface="微软雅黑" charset="0"/>
+                <a:ea typeface="微软雅黑" charset="0"/>
+                <a:cs typeface="微软雅黑" charset="0"/>
+              </a:rPr>
+              <a:t>学习</a:t>
+            </a:r>
+            <a:r>
+              <a:rPr lang="en-US" altLang="zh-CN" sz="2000" b="1">
+                <a:latin typeface="微软雅黑" charset="0"/>
+                <a:ea typeface="微软雅黑" charset="0"/>
+                <a:cs typeface="微软雅黑" charset="0"/>
+              </a:rPr>
+              <a:t>MASK</a:t>
+            </a:r>
+            <a:r>
+              <a:rPr lang="zh-CN" altLang="en-US" sz="2000" b="1">
+                <a:latin typeface="微软雅黑" charset="0"/>
+                <a:ea typeface="微软雅黑" charset="0"/>
+                <a:cs typeface="微软雅黑" charset="0"/>
+              </a:rPr>
+              <a:t>单词</a:t>
+            </a:r>
+            <a:r>
+              <a:rPr lang="en-US" altLang="zh-CN" sz="2000" b="1">
+                <a:latin typeface="微软雅黑" charset="0"/>
+                <a:ea typeface="微软雅黑" charset="0"/>
+                <a:cs typeface="微软雅黑" charset="0"/>
+              </a:rPr>
+              <a:t> 2.</a:t>
+            </a:r>
+            <a:r>
+              <a:rPr lang="zh-CN" altLang="en-US" sz="2000" b="1">
+                <a:latin typeface="微软雅黑" charset="0"/>
+                <a:ea typeface="微软雅黑" charset="0"/>
+                <a:cs typeface="微软雅黑" charset="0"/>
+              </a:rPr>
+              <a:t>判断句子是否</a:t>
+            </a:r>
+            <a:r>
+              <a:rPr lang="zh-CN" altLang="en-US" sz="2000" b="1">
+                <a:latin typeface="微软雅黑" charset="0"/>
+                <a:ea typeface="微软雅黑" charset="0"/>
+                <a:cs typeface="微软雅黑" charset="0"/>
+              </a:rPr>
+              <a:t>相邻</a:t>
+            </a:r>
+            <a:endParaRPr lang="zh-CN" altLang="en-US" sz="2000" b="1">
+              <a:latin typeface="微软雅黑" charset="0"/>
+              <a:ea typeface="微软雅黑" charset="0"/>
+              <a:cs typeface="微软雅黑" charset="0"/>
+            </a:endParaRPr>
+          </a:p>
+        </p:txBody>
+      </p:sp>
+      <p:sp>
+        <p:nvSpPr>
+          <p:cNvPr id="9" name="文本框 8"/>
+          <p:cNvSpPr txBox="1"/>
+          <p:nvPr>
+            <p:custDataLst>
+              <p:tags r:id="rId11"/>
+            </p:custDataLst>
+          </p:nvPr>
+        </p:nvSpPr>
+        <p:spPr>
+          <a:xfrm>
+            <a:off x="4198620" y="4514850"/>
+            <a:ext cx="5346065" cy="450215"/>
+          </a:xfrm>
+          <a:prstGeom prst="rect">
+            <a:avLst/>
+          </a:prstGeom>
+          <a:noFill/>
+        </p:spPr>
+        <p:txBody>
+          <a:bodyPr wrap="square" rtlCol="0">
+            <a:noAutofit/>
+          </a:bodyPr>
+          <a:p>
+            <a:pPr algn="ctr"/>
+            <a:r>
+              <a:rPr lang="zh-CN" altLang="en-US" sz="1200" b="1">
+                <a:latin typeface="微软雅黑" charset="0"/>
+                <a:ea typeface="微软雅黑" charset="0"/>
+                <a:cs typeface="微软雅黑" charset="0"/>
+              </a:rPr>
+              <a:t>随机在数据集中抽取两个句子</a:t>
+            </a:r>
+            <a:br>
+              <a:rPr lang="zh-CN" altLang="en-US" sz="1200" b="1">
+                <a:latin typeface="微软雅黑" charset="0"/>
+                <a:ea typeface="微软雅黑" charset="0"/>
+                <a:cs typeface="微软雅黑" charset="0"/>
+              </a:rPr>
+            </a:br>
+            <a:r>
+              <a:rPr lang="zh-CN" altLang="en-US" sz="1200" b="1">
+                <a:latin typeface="微软雅黑" charset="0"/>
+                <a:ea typeface="微软雅黑" charset="0"/>
+                <a:cs typeface="微软雅黑" charset="0"/>
+              </a:rPr>
+              <a:t>并给出是否是相邻关系，用于预训练</a:t>
+            </a:r>
+            <a:r>
+              <a:rPr lang="en-US" altLang="zh-CN" sz="1200" b="1">
+                <a:latin typeface="微软雅黑" charset="0"/>
+                <a:ea typeface="微软雅黑" charset="0"/>
+                <a:cs typeface="微软雅黑" charset="0"/>
+              </a:rPr>
+              <a:t>NSP</a:t>
+            </a:r>
+            <a:r>
+              <a:rPr lang="zh-CN" altLang="en-US" sz="1200" b="1">
+                <a:latin typeface="微软雅黑" charset="0"/>
+                <a:ea typeface="微软雅黑" charset="0"/>
+                <a:cs typeface="微软雅黑" charset="0"/>
+              </a:rPr>
+              <a:t>的</a:t>
+            </a:r>
+            <a:r>
+              <a:rPr lang="zh-CN" altLang="en-US" sz="1200" b="1">
+                <a:latin typeface="微软雅黑" charset="0"/>
+                <a:ea typeface="微软雅黑" charset="0"/>
+                <a:cs typeface="微软雅黑" charset="0"/>
+              </a:rPr>
+              <a:t>学习</a:t>
+            </a:r>
+            <a:endParaRPr lang="zh-CN" altLang="en-US" sz="1200" b="1">
+              <a:latin typeface="微软雅黑" charset="0"/>
+              <a:ea typeface="微软雅黑" charset="0"/>
+              <a:cs typeface="微软雅黑" charset="0"/>
+            </a:endParaRPr>
+          </a:p>
+        </p:txBody>
+      </p:sp>
+      <p:sp>
+        <p:nvSpPr>
+          <p:cNvPr id="10" name="文本框 9"/>
+          <p:cNvSpPr txBox="1"/>
+          <p:nvPr>
+            <p:custDataLst>
+              <p:tags r:id="rId12"/>
+            </p:custDataLst>
+          </p:nvPr>
+        </p:nvSpPr>
+        <p:spPr>
+          <a:xfrm>
+            <a:off x="8097520" y="3741420"/>
+            <a:ext cx="5346065" cy="450215"/>
+          </a:xfrm>
+          <a:prstGeom prst="rect">
+            <a:avLst/>
+          </a:prstGeom>
+          <a:noFill/>
+        </p:spPr>
+        <p:txBody>
+          <a:bodyPr wrap="square" rtlCol="0">
+            <a:noAutofit/>
+          </a:bodyPr>
+          <a:p>
+            <a:pPr algn="ctr"/>
+            <a:r>
+              <a:rPr lang="zh-CN" altLang="en-US" sz="1200" b="1">
+                <a:latin typeface="微软雅黑" charset="0"/>
+                <a:ea typeface="微软雅黑" charset="0"/>
+                <a:cs typeface="微软雅黑" charset="0"/>
+              </a:rPr>
+              <a:t>对于输入的句子，</a:t>
+            </a:r>
+            <a:r>
+              <a:rPr lang="en-US" altLang="zh-CN" sz="1200" b="1">
+                <a:latin typeface="微软雅黑" charset="0"/>
+                <a:ea typeface="微软雅黑" charset="0"/>
+                <a:cs typeface="微软雅黑" charset="0"/>
+              </a:rPr>
+              <a:t>15%</a:t>
+            </a:r>
+            <a:r>
+              <a:rPr lang="zh-CN" altLang="en-US" sz="1200" b="1">
+                <a:latin typeface="微软雅黑" charset="0"/>
+                <a:ea typeface="微软雅黑" charset="0"/>
+                <a:cs typeface="微软雅黑" charset="0"/>
+              </a:rPr>
+              <a:t>会经过特殊处理</a:t>
+            </a:r>
+            <a:br>
+              <a:rPr lang="zh-CN" altLang="en-US" sz="1200" b="1">
+                <a:latin typeface="微软雅黑" charset="0"/>
+                <a:ea typeface="微软雅黑" charset="0"/>
+                <a:cs typeface="微软雅黑" charset="0"/>
+              </a:rPr>
+            </a:br>
+            <a:r>
+              <a:rPr lang="zh-CN" altLang="en-US" sz="1200" b="1">
+                <a:latin typeface="微软雅黑" charset="0"/>
+                <a:ea typeface="微软雅黑" charset="0"/>
+                <a:cs typeface="微软雅黑" charset="0"/>
+              </a:rPr>
+              <a:t>其中</a:t>
+            </a:r>
+            <a:r>
+              <a:rPr lang="en-US" altLang="zh-CN" sz="1200" b="1">
+                <a:latin typeface="微软雅黑" charset="0"/>
+                <a:ea typeface="微软雅黑" charset="0"/>
+                <a:cs typeface="微软雅黑" charset="0"/>
+              </a:rPr>
+              <a:t>80%</a:t>
+            </a:r>
+            <a:r>
+              <a:rPr lang="zh-CN" altLang="en-US" sz="1200" b="1">
+                <a:latin typeface="微软雅黑" charset="0"/>
+                <a:ea typeface="微软雅黑" charset="0"/>
+                <a:cs typeface="微软雅黑" charset="0"/>
+              </a:rPr>
+              <a:t>会被替换为</a:t>
+            </a:r>
+            <a:r>
+              <a:rPr lang="en-US" altLang="zh-CN" sz="1200" b="1">
+                <a:latin typeface="微软雅黑" charset="0"/>
+                <a:ea typeface="微软雅黑" charset="0"/>
+                <a:cs typeface="微软雅黑" charset="0"/>
+              </a:rPr>
+              <a:t>[MASK]</a:t>
+            </a:r>
+            <a:br>
+              <a:rPr lang="en-US" altLang="zh-CN" sz="1200" b="1">
+                <a:latin typeface="微软雅黑" charset="0"/>
+                <a:ea typeface="微软雅黑" charset="0"/>
+                <a:cs typeface="微软雅黑" charset="0"/>
+              </a:rPr>
+            </a:br>
+            <a:r>
+              <a:rPr lang="en-US" altLang="zh-CN" sz="1200" b="1">
+                <a:latin typeface="微软雅黑" charset="0"/>
+                <a:ea typeface="微软雅黑" charset="0"/>
+                <a:cs typeface="微软雅黑" charset="0"/>
+              </a:rPr>
+              <a:t>10%</a:t>
+            </a:r>
+            <a:r>
+              <a:rPr lang="zh-CN" altLang="en-US" sz="1200" b="1">
+                <a:latin typeface="微软雅黑" charset="0"/>
+                <a:ea typeface="微软雅黑" charset="0"/>
+                <a:cs typeface="微软雅黑" charset="0"/>
+              </a:rPr>
+              <a:t>会替换成其他的单词</a:t>
+            </a:r>
+            <a:r>
+              <a:rPr lang="en-US" altLang="zh-CN" sz="1200" b="1">
+                <a:latin typeface="微软雅黑" charset="0"/>
+                <a:ea typeface="微软雅黑" charset="0"/>
+                <a:cs typeface="微软雅黑" charset="0"/>
+              </a:rPr>
+              <a:t>(hairy-&gt;apple)</a:t>
+            </a:r>
+            <a:br>
+              <a:rPr lang="en-US" altLang="zh-CN" sz="1200" b="1">
+                <a:latin typeface="微软雅黑" charset="0"/>
+                <a:ea typeface="微软雅黑" charset="0"/>
+                <a:cs typeface="微软雅黑" charset="0"/>
+              </a:rPr>
+            </a:br>
+            <a:r>
+              <a:rPr lang="en-US" altLang="zh-CN" sz="1200" b="1">
+                <a:latin typeface="微软雅黑" charset="0"/>
+                <a:ea typeface="微软雅黑" charset="0"/>
+                <a:cs typeface="微软雅黑" charset="0"/>
+              </a:rPr>
+              <a:t>10%</a:t>
+            </a:r>
+            <a:r>
+              <a:rPr lang="zh-CN" altLang="en-US" sz="1200" b="1">
+                <a:latin typeface="微软雅黑" charset="0"/>
+                <a:ea typeface="微软雅黑" charset="0"/>
+                <a:cs typeface="微软雅黑" charset="0"/>
+              </a:rPr>
+              <a:t>不做任何</a:t>
+            </a:r>
+            <a:r>
+              <a:rPr lang="zh-CN" altLang="en-US" sz="1200" b="1">
+                <a:latin typeface="微软雅黑" charset="0"/>
+                <a:ea typeface="微软雅黑" charset="0"/>
+                <a:cs typeface="微软雅黑" charset="0"/>
+              </a:rPr>
+              <a:t>处理</a:t>
+            </a:r>
+            <a:endParaRPr lang="zh-CN" altLang="en-US" sz="1200" b="1">
+              <a:latin typeface="微软雅黑" charset="0"/>
+              <a:ea typeface="微软雅黑" charset="0"/>
+              <a:cs typeface="微软雅黑" charset="0"/>
+            </a:endParaRPr>
+          </a:p>
+        </p:txBody>
+      </p:sp>
+      <p:sp>
+        <p:nvSpPr>
+          <p:cNvPr id="11" name="矩形: 圆角 36"/>
+          <p:cNvSpPr/>
+          <p:nvPr>
+            <p:custDataLst>
+              <p:tags r:id="rId13"/>
+            </p:custDataLst>
+          </p:nvPr>
+        </p:nvSpPr>
+        <p:spPr>
+          <a:xfrm rot="10800000" flipV="1">
+            <a:off x="59055" y="0"/>
+            <a:ext cx="4937760" cy="6858000"/>
+          </a:xfrm>
+          <a:prstGeom prst="roundRect">
+            <a:avLst>
+              <a:gd name="adj" fmla="val 10039"/>
+            </a:avLst>
+          </a:prstGeom>
+          <a:noFill/>
+          <a:ln w="38100">
+            <a:solidFill>
+              <a:schemeClr val="tx1"/>
+            </a:solidFill>
+            <a:prstDash val="lgDash"/>
+          </a:ln>
+        </p:spPr>
+        <p:style>
+          <a:lnRef idx="2">
+            <a:schemeClr val="accent1">
+              <a:shade val="15000"/>
+            </a:schemeClr>
+          </a:lnRef>
+          <a:fillRef idx="1">
+            <a:schemeClr val="accent1"/>
+          </a:fillRef>
+          <a:effectRef idx="0">
+            <a:schemeClr val="accent1"/>
+          </a:effectRef>
+          <a:fontRef idx="minor">
+            <a:schemeClr val="lt1"/>
+          </a:fontRef>
+        </p:style>
+        <p:txBody>
+          <a:bodyPr rtlCol="0" anchor="ctr"/>
+          <a:p>
+            <a:pPr algn="ctr"/>
+            <a:endParaRPr lang="zh-CN" altLang="en-US"/>
+          </a:p>
+        </p:txBody>
+      </p:sp>
+      <p:sp>
+        <p:nvSpPr>
+          <p:cNvPr id="12" name="文本框 11"/>
+          <p:cNvSpPr txBox="1"/>
+          <p:nvPr>
+            <p:custDataLst>
+              <p:tags r:id="rId14"/>
+            </p:custDataLst>
+          </p:nvPr>
+        </p:nvSpPr>
+        <p:spPr>
+          <a:xfrm>
+            <a:off x="1379220" y="4064635"/>
+            <a:ext cx="2387600" cy="450215"/>
+          </a:xfrm>
+          <a:prstGeom prst="rect">
+            <a:avLst/>
+          </a:prstGeom>
+          <a:noFill/>
+        </p:spPr>
+        <p:txBody>
+          <a:bodyPr wrap="square" rtlCol="0">
+            <a:noAutofit/>
+          </a:bodyPr>
+          <a:p>
+            <a:pPr algn="ctr"/>
+            <a:r>
+              <a:rPr lang="zh-CN" altLang="en-US" b="1">
+                <a:latin typeface="微软雅黑" charset="0"/>
+                <a:ea typeface="微软雅黑" charset="0"/>
+                <a:cs typeface="微软雅黑" charset="0"/>
+              </a:rPr>
+              <a:t>预训练部分</a:t>
+            </a:r>
+            <a:endParaRPr lang="zh-CN" altLang="en-US" b="1">
+              <a:latin typeface="微软雅黑" charset="0"/>
+              <a:ea typeface="微软雅黑" charset="0"/>
+              <a:cs typeface="微软雅黑" charset="0"/>
+            </a:endParaRPr>
+          </a:p>
+        </p:txBody>
+      </p:sp>
+      <p:sp>
+        <p:nvSpPr>
+          <p:cNvPr id="13" name="矩形: 圆角 36"/>
+          <p:cNvSpPr/>
+          <p:nvPr>
+            <p:custDataLst>
+              <p:tags r:id="rId15"/>
+            </p:custDataLst>
+          </p:nvPr>
+        </p:nvSpPr>
+        <p:spPr>
+          <a:xfrm rot="10800000" flipV="1">
+            <a:off x="5152390" y="4514850"/>
+            <a:ext cx="3814445" cy="2216150"/>
+          </a:xfrm>
+          <a:prstGeom prst="roundRect">
+            <a:avLst>
+              <a:gd name="adj" fmla="val 10039"/>
+            </a:avLst>
+          </a:prstGeom>
+          <a:noFill/>
+          <a:ln w="38100">
+            <a:solidFill>
+              <a:schemeClr val="tx1"/>
+            </a:solidFill>
+            <a:prstDash val="lgDash"/>
+          </a:ln>
+        </p:spPr>
+        <p:style>
+          <a:lnRef idx="2">
+            <a:schemeClr val="accent1">
+              <a:shade val="15000"/>
+            </a:schemeClr>
+          </a:lnRef>
+          <a:fillRef idx="1">
+            <a:schemeClr val="accent1"/>
+          </a:fillRef>
+          <a:effectRef idx="0">
+            <a:schemeClr val="accent1"/>
+          </a:effectRef>
+          <a:fontRef idx="minor">
+            <a:schemeClr val="lt1"/>
+          </a:fontRef>
+        </p:style>
+        <p:txBody>
+          <a:bodyPr rtlCol="0" anchor="ctr"/>
+          <a:p>
+            <a:pPr algn="ctr"/>
+            <a:endParaRPr lang="zh-CN" altLang="en-US"/>
+          </a:p>
+        </p:txBody>
+      </p:sp>
+      <p:sp>
+        <p:nvSpPr>
+          <p:cNvPr id="14" name="矩形: 圆角 36"/>
+          <p:cNvSpPr/>
+          <p:nvPr>
+            <p:custDataLst>
+              <p:tags r:id="rId16"/>
+            </p:custDataLst>
+          </p:nvPr>
+        </p:nvSpPr>
+        <p:spPr>
+          <a:xfrm rot="10800000" flipV="1">
+            <a:off x="9121775" y="3741420"/>
+            <a:ext cx="3070225" cy="3116580"/>
+          </a:xfrm>
+          <a:prstGeom prst="roundRect">
+            <a:avLst>
+              <a:gd name="adj" fmla="val 10039"/>
+            </a:avLst>
+          </a:prstGeom>
+          <a:noFill/>
+          <a:ln w="38100">
+            <a:solidFill>
+              <a:schemeClr val="tx1"/>
+            </a:solidFill>
+            <a:prstDash val="lgDash"/>
+          </a:ln>
+        </p:spPr>
+        <p:style>
+          <a:lnRef idx="2">
+            <a:schemeClr val="accent1">
+              <a:shade val="15000"/>
+            </a:schemeClr>
+          </a:lnRef>
+          <a:fillRef idx="1">
+            <a:schemeClr val="accent1"/>
+          </a:fillRef>
+          <a:effectRef idx="0">
+            <a:schemeClr val="accent1"/>
+          </a:effectRef>
+          <a:fontRef idx="minor">
+            <a:schemeClr val="lt1"/>
+          </a:fontRef>
+        </p:style>
+        <p:txBody>
+          <a:bodyPr rtlCol="0" anchor="ctr"/>
+          <a:p>
+            <a:pPr algn="ctr"/>
+            <a:endParaRPr lang="zh-CN" altLang="en-US"/>
+          </a:p>
+        </p:txBody>
+      </p:sp>
+      <p:sp>
+        <p:nvSpPr>
+          <p:cNvPr id="15" name="文本框 14"/>
+          <p:cNvSpPr txBox="1"/>
+          <p:nvPr>
+            <p:custDataLst>
+              <p:tags r:id="rId17"/>
+            </p:custDataLst>
+          </p:nvPr>
+        </p:nvSpPr>
+        <p:spPr>
+          <a:xfrm>
+            <a:off x="46990" y="3388995"/>
+            <a:ext cx="5346065" cy="742315"/>
+          </a:xfrm>
+          <a:prstGeom prst="rect">
+            <a:avLst/>
+          </a:prstGeom>
+          <a:noFill/>
+        </p:spPr>
+        <p:txBody>
+          <a:bodyPr wrap="square" rtlCol="0">
+            <a:noAutofit/>
+          </a:bodyPr>
+          <a:p>
+            <a:pPr algn="ctr"/>
+            <a:r>
+              <a:rPr lang="zh-CN" altLang="en-US" sz="1200" b="1">
+                <a:latin typeface="微软雅黑" charset="0"/>
+                <a:ea typeface="微软雅黑" charset="0"/>
+                <a:cs typeface="微软雅黑" charset="0"/>
+              </a:rPr>
+              <a:t>预训练</a:t>
+            </a:r>
+            <a:r>
+              <a:rPr lang="zh-CN" altLang="en-US" sz="1200" b="1">
+                <a:latin typeface="微软雅黑" charset="0"/>
+                <a:ea typeface="微软雅黑" charset="0"/>
+                <a:cs typeface="微软雅黑" charset="0"/>
+              </a:rPr>
+              <a:t>部分输入的是两个被遮掩的句子</a:t>
+            </a:r>
+            <a:br>
+              <a:rPr lang="zh-CN" altLang="en-US" sz="1200" b="1">
+                <a:latin typeface="微软雅黑" charset="0"/>
+                <a:ea typeface="微软雅黑" charset="0"/>
+                <a:cs typeface="微软雅黑" charset="0"/>
+              </a:rPr>
+            </a:br>
+            <a:endParaRPr lang="zh-CN" altLang="en-US" sz="1200" b="1">
+              <a:latin typeface="微软雅黑" charset="0"/>
+              <a:ea typeface="微软雅黑" charset="0"/>
+              <a:cs typeface="微软雅黑" charset="0"/>
+            </a:endParaRPr>
+          </a:p>
+        </p:txBody>
+      </p:sp>
+      <p:sp>
+        <p:nvSpPr>
+          <p:cNvPr id="16" name="文本框 15"/>
+          <p:cNvSpPr txBox="1"/>
+          <p:nvPr>
+            <p:custDataLst>
+              <p:tags r:id="rId18"/>
+            </p:custDataLst>
+          </p:nvPr>
+        </p:nvSpPr>
+        <p:spPr>
+          <a:xfrm>
+            <a:off x="59055" y="178435"/>
+            <a:ext cx="1957070" cy="742315"/>
+          </a:xfrm>
+          <a:prstGeom prst="rect">
+            <a:avLst/>
+          </a:prstGeom>
+          <a:noFill/>
+        </p:spPr>
+        <p:txBody>
+          <a:bodyPr wrap="square" rtlCol="0">
+            <a:noAutofit/>
+          </a:bodyPr>
+          <a:p>
+            <a:pPr algn="ctr"/>
+            <a:r>
+              <a:rPr lang="en-US" altLang="zh-CN" sz="1200" b="1">
+                <a:latin typeface="微软雅黑" charset="0"/>
+                <a:ea typeface="微软雅黑" charset="0"/>
+                <a:cs typeface="微软雅黑" charset="0"/>
+              </a:rPr>
+              <a:t>NSP</a:t>
+            </a:r>
+            <a:br>
+              <a:rPr lang="en-US" altLang="zh-CN" sz="1200" b="1">
+                <a:latin typeface="微软雅黑" charset="0"/>
+                <a:ea typeface="微软雅黑" charset="0"/>
+                <a:cs typeface="微软雅黑" charset="0"/>
+              </a:rPr>
+            </a:br>
+            <a:r>
+              <a:rPr lang="en-US" altLang="zh-CN" sz="1200" b="1">
+                <a:latin typeface="微软雅黑" charset="0"/>
+                <a:ea typeface="微软雅黑" charset="0"/>
+                <a:cs typeface="微软雅黑" charset="0"/>
+              </a:rPr>
+              <a:t>[CLS]</a:t>
+            </a:r>
+            <a:r>
+              <a:rPr lang="zh-CN" altLang="en-US" sz="1200" b="1">
+                <a:latin typeface="微软雅黑" charset="0"/>
+                <a:ea typeface="微软雅黑" charset="0"/>
+                <a:cs typeface="微软雅黑" charset="0"/>
+              </a:rPr>
+              <a:t>作为全局预测</a:t>
+            </a:r>
+            <a:br>
+              <a:rPr lang="zh-CN" altLang="en-US" sz="1200" b="1">
+                <a:latin typeface="微软雅黑" charset="0"/>
+                <a:ea typeface="微软雅黑" charset="0"/>
+                <a:cs typeface="微软雅黑" charset="0"/>
+              </a:rPr>
+            </a:br>
+            <a:r>
+              <a:rPr lang="zh-CN" altLang="en-US" sz="1200" b="1">
+                <a:latin typeface="微软雅黑" charset="0"/>
+                <a:ea typeface="微软雅黑" charset="0"/>
+                <a:cs typeface="微软雅黑" charset="0"/>
+              </a:rPr>
+              <a:t>判断两个句子是否</a:t>
+            </a:r>
+            <a:r>
+              <a:rPr lang="zh-CN" altLang="en-US" sz="1200" b="1">
+                <a:latin typeface="微软雅黑" charset="0"/>
+                <a:ea typeface="微软雅黑" charset="0"/>
+                <a:cs typeface="微软雅黑" charset="0"/>
+              </a:rPr>
+              <a:t>相邻</a:t>
+            </a:r>
+            <a:endParaRPr lang="zh-CN" altLang="en-US" sz="1200" b="1">
+              <a:latin typeface="微软雅黑" charset="0"/>
+              <a:ea typeface="微软雅黑" charset="0"/>
+              <a:cs typeface="微软雅黑" charset="0"/>
+            </a:endParaRPr>
+          </a:p>
+        </p:txBody>
+      </p:sp>
+      <p:sp>
+        <p:nvSpPr>
+          <p:cNvPr id="17" name="文本框 16"/>
+          <p:cNvSpPr txBox="1"/>
+          <p:nvPr>
+            <p:custDataLst>
+              <p:tags r:id="rId19"/>
+            </p:custDataLst>
+          </p:nvPr>
+        </p:nvSpPr>
+        <p:spPr>
+          <a:xfrm>
+            <a:off x="2143125" y="178435"/>
+            <a:ext cx="1957070" cy="742315"/>
+          </a:xfrm>
+          <a:prstGeom prst="rect">
+            <a:avLst/>
+          </a:prstGeom>
+          <a:noFill/>
+        </p:spPr>
+        <p:txBody>
+          <a:bodyPr wrap="square" rtlCol="0">
+            <a:noAutofit/>
+          </a:bodyPr>
+          <a:p>
+            <a:pPr algn="ctr"/>
+            <a:r>
+              <a:rPr lang="en-US" altLang="zh-CN" sz="1200" b="1">
+                <a:latin typeface="微软雅黑" charset="0"/>
+                <a:ea typeface="微软雅黑" charset="0"/>
+                <a:cs typeface="微软雅黑" charset="0"/>
+              </a:rPr>
+              <a:t>MASK LM</a:t>
+            </a:r>
+            <a:br>
+              <a:rPr lang="en-US" altLang="zh-CN" sz="1200" b="1">
+                <a:latin typeface="微软雅黑" charset="0"/>
+                <a:ea typeface="微软雅黑" charset="0"/>
+                <a:cs typeface="微软雅黑" charset="0"/>
+              </a:rPr>
+            </a:br>
+            <a:r>
+              <a:rPr lang="zh-CN" altLang="en-US" sz="1200" b="1">
+                <a:latin typeface="微软雅黑" charset="0"/>
+                <a:ea typeface="微软雅黑" charset="0"/>
+                <a:cs typeface="微软雅黑" charset="0"/>
+              </a:rPr>
+              <a:t>填补两个</a:t>
+            </a:r>
+            <a:r>
+              <a:rPr lang="zh-CN" altLang="en-US" sz="1200" b="1">
+                <a:latin typeface="微软雅黑" charset="0"/>
+                <a:ea typeface="微软雅黑" charset="0"/>
+                <a:cs typeface="微软雅黑" charset="0"/>
+              </a:rPr>
+              <a:t>句子</a:t>
+            </a:r>
+            <a:br>
+              <a:rPr lang="zh-CN" altLang="en-US" sz="1200" b="1">
+                <a:latin typeface="微软雅黑" charset="0"/>
+                <a:ea typeface="微软雅黑" charset="0"/>
+                <a:cs typeface="微软雅黑" charset="0"/>
+              </a:rPr>
+            </a:br>
+            <a:r>
+              <a:rPr lang="zh-CN" altLang="en-US" sz="1200" b="1">
+                <a:latin typeface="微软雅黑" charset="0"/>
+                <a:ea typeface="微软雅黑" charset="0"/>
+                <a:cs typeface="微软雅黑" charset="0"/>
+              </a:rPr>
+              <a:t>被</a:t>
+            </a:r>
+            <a:r>
+              <a:rPr lang="en-US" altLang="zh-CN" sz="1200" b="1">
+                <a:latin typeface="微软雅黑" charset="0"/>
+                <a:ea typeface="微软雅黑" charset="0"/>
+                <a:cs typeface="微软雅黑" charset="0"/>
+              </a:rPr>
+              <a:t>MASK</a:t>
+            </a:r>
+            <a:r>
+              <a:rPr lang="zh-CN" altLang="en-US" sz="1200" b="1">
+                <a:latin typeface="微软雅黑" charset="0"/>
+                <a:ea typeface="微软雅黑" charset="0"/>
+                <a:cs typeface="微软雅黑" charset="0"/>
+              </a:rPr>
+              <a:t>的</a:t>
+            </a:r>
+            <a:r>
+              <a:rPr lang="zh-CN" altLang="en-US" sz="1200" b="1">
+                <a:latin typeface="微软雅黑" charset="0"/>
+                <a:ea typeface="微软雅黑" charset="0"/>
+                <a:cs typeface="微软雅黑" charset="0"/>
+              </a:rPr>
+              <a:t>单词</a:t>
+            </a:r>
+            <a:endParaRPr lang="zh-CN" altLang="en-US" sz="1200" b="1">
+              <a:latin typeface="微软雅黑" charset="0"/>
+              <a:ea typeface="微软雅黑" charset="0"/>
+              <a:cs typeface="微软雅黑" charset="0"/>
+            </a:endParaRPr>
+          </a:p>
+        </p:txBody>
+      </p:sp>
+      <p:sp>
+        <p:nvSpPr>
+          <p:cNvPr id="18" name="文本框 17"/>
+          <p:cNvSpPr txBox="1"/>
+          <p:nvPr>
+            <p:custDataLst>
+              <p:tags r:id="rId20"/>
+            </p:custDataLst>
+          </p:nvPr>
+        </p:nvSpPr>
+        <p:spPr>
+          <a:xfrm>
+            <a:off x="6966585" y="3995420"/>
+            <a:ext cx="2387600" cy="450215"/>
+          </a:xfrm>
+          <a:prstGeom prst="rect">
+            <a:avLst/>
+          </a:prstGeom>
+          <a:noFill/>
+        </p:spPr>
+        <p:txBody>
+          <a:bodyPr wrap="square" rtlCol="0">
+            <a:noAutofit/>
+          </a:bodyPr>
+          <a:p>
+            <a:pPr algn="ctr"/>
+            <a:r>
+              <a:rPr lang="zh-CN" altLang="en-US" b="1">
+                <a:latin typeface="微软雅黑" charset="0"/>
+                <a:ea typeface="微软雅黑" charset="0"/>
+                <a:cs typeface="微软雅黑" charset="0"/>
+              </a:rPr>
+              <a:t>微调部分</a:t>
+            </a:r>
+            <a:endParaRPr lang="zh-CN" altLang="en-US" b="1">
+              <a:latin typeface="微软雅黑" charset="0"/>
+              <a:ea typeface="微软雅黑" charset="0"/>
+              <a:cs typeface="微软雅黑" charset="0"/>
+            </a:endParaRPr>
+          </a:p>
+        </p:txBody>
+      </p:sp>
+      <p:sp>
+        <p:nvSpPr>
+          <p:cNvPr id="19" name="文本框 18"/>
+          <p:cNvSpPr txBox="1"/>
+          <p:nvPr>
+            <p:custDataLst>
+              <p:tags r:id="rId21"/>
+            </p:custDataLst>
+          </p:nvPr>
+        </p:nvSpPr>
+        <p:spPr>
+          <a:xfrm>
+            <a:off x="10549890" y="1459865"/>
+            <a:ext cx="1642110" cy="450215"/>
+          </a:xfrm>
+          <a:prstGeom prst="rect">
+            <a:avLst/>
+          </a:prstGeom>
+          <a:noFill/>
+        </p:spPr>
+        <p:txBody>
+          <a:bodyPr wrap="square" rtlCol="0">
+            <a:noAutofit/>
+          </a:bodyPr>
+          <a:p>
+            <a:pPr algn="ctr"/>
+            <a:r>
+              <a:rPr lang="zh-CN" altLang="en-US" sz="1200" b="1">
+                <a:latin typeface="微软雅黑" charset="0"/>
+                <a:ea typeface="微软雅黑" charset="0"/>
+                <a:cs typeface="微软雅黑" charset="0"/>
+              </a:rPr>
+              <a:t>根据不同的下游任务进行</a:t>
+            </a:r>
+            <a:r>
+              <a:rPr lang="zh-CN" altLang="en-US" sz="1200" b="1">
+                <a:latin typeface="微软雅黑" charset="0"/>
+                <a:ea typeface="微软雅黑" charset="0"/>
+                <a:cs typeface="微软雅黑" charset="0"/>
+              </a:rPr>
+              <a:t>微调</a:t>
+            </a:r>
+            <a:endParaRPr lang="zh-CN" altLang="en-US" sz="1200" b="1">
+              <a:latin typeface="微软雅黑" charset="0"/>
+              <a:ea typeface="微软雅黑" charset="0"/>
+              <a:cs typeface="微软雅黑" charset="0"/>
+            </a:endParaRPr>
+          </a:p>
+        </p:txBody>
+      </p:sp>
+      <p:sp>
+        <p:nvSpPr>
+          <p:cNvPr id="20" name="文本框 19"/>
+          <p:cNvSpPr txBox="1"/>
+          <p:nvPr>
+            <p:custDataLst>
+              <p:tags r:id="rId22"/>
+            </p:custDataLst>
+          </p:nvPr>
+        </p:nvSpPr>
+        <p:spPr>
+          <a:xfrm>
+            <a:off x="4667885" y="5481955"/>
+            <a:ext cx="5346065" cy="450215"/>
+          </a:xfrm>
+          <a:prstGeom prst="rect">
+            <a:avLst/>
+          </a:prstGeom>
+          <a:noFill/>
+        </p:spPr>
+        <p:txBody>
+          <a:bodyPr wrap="square" rtlCol="0">
+            <a:noAutofit/>
+          </a:bodyPr>
+          <a:p>
+            <a:pPr algn="ctr"/>
+            <a:r>
+              <a:rPr lang="en-US" altLang="zh-CN" sz="1200" b="1">
+                <a:latin typeface="微软雅黑" charset="0"/>
+                <a:ea typeface="微软雅黑" charset="0"/>
+                <a:cs typeface="微软雅黑" charset="0"/>
+              </a:rPr>
+              <a:t>50%</a:t>
+            </a:r>
+            <a:r>
+              <a:rPr lang="zh-CN" altLang="en-US" sz="1200" b="1">
+                <a:latin typeface="微软雅黑" charset="0"/>
+                <a:ea typeface="微软雅黑" charset="0"/>
+                <a:cs typeface="微软雅黑" charset="0"/>
+              </a:rPr>
+              <a:t>的概率选取相邻</a:t>
+            </a:r>
+            <a:br>
+              <a:rPr lang="zh-CN" altLang="en-US" sz="1200" b="1">
+                <a:latin typeface="微软雅黑" charset="0"/>
+                <a:ea typeface="微软雅黑" charset="0"/>
+                <a:cs typeface="微软雅黑" charset="0"/>
+              </a:rPr>
+            </a:br>
+            <a:r>
+              <a:rPr lang="en-US" altLang="zh-CN" sz="1200" b="1">
+                <a:latin typeface="微软雅黑" charset="0"/>
+                <a:ea typeface="微软雅黑" charset="0"/>
+                <a:cs typeface="微软雅黑" charset="0"/>
+              </a:rPr>
+              <a:t>50%</a:t>
+            </a:r>
+            <a:r>
+              <a:rPr lang="zh-CN" altLang="en-US" sz="1200" b="1">
+                <a:latin typeface="微软雅黑" charset="0"/>
+                <a:ea typeface="微软雅黑" charset="0"/>
+                <a:cs typeface="微软雅黑" charset="0"/>
+              </a:rPr>
+              <a:t>的概率选取不</a:t>
+            </a:r>
+            <a:r>
+              <a:rPr lang="zh-CN" altLang="en-US" sz="1200" b="1">
+                <a:latin typeface="微软雅黑" charset="0"/>
+                <a:ea typeface="微软雅黑" charset="0"/>
+                <a:cs typeface="微软雅黑" charset="0"/>
+              </a:rPr>
+              <a:t>相邻</a:t>
+            </a:r>
+            <a:endParaRPr lang="zh-CN" altLang="en-US" sz="1200" b="1">
+              <a:latin typeface="微软雅黑" charset="0"/>
+              <a:ea typeface="微软雅黑" charset="0"/>
+              <a:cs typeface="微软雅黑" charset="0"/>
+            </a:endParaRPr>
+          </a:p>
+        </p:txBody>
+      </p:sp>
     </p:spTree>
   </p:cSld>
   <p:clrMapOvr>
@@ -4737,7 +6419,79 @@
 </p:tagLst>
 </file>
 
+<file path=ppt/tags/tag18.xml><?xml version="1.0" encoding="utf-8"?>
+<p:tagLst xmlns:p="http://schemas.openxmlformats.org/presentationml/2006/main">
+  <p:tag name="KSO_WM_BEAUTIFY_FLAG" val=""/>
+</p:tagLst>
+</file>
+
+<file path=ppt/tags/tag19.xml><?xml version="1.0" encoding="utf-8"?>
+<p:tagLst xmlns:p="http://schemas.openxmlformats.org/presentationml/2006/main">
+  <p:tag name="KSO_WM_BEAUTIFY_FLAG" val=""/>
+</p:tagLst>
+</file>
+
 <file path=ppt/tags/tag2.xml><?xml version="1.0" encoding="utf-8"?>
+<p:tagLst xmlns:p="http://schemas.openxmlformats.org/presentationml/2006/main">
+  <p:tag name="KSO_WM_BEAUTIFY_FLAG" val=""/>
+</p:tagLst>
+</file>
+
+<file path=ppt/tags/tag20.xml><?xml version="1.0" encoding="utf-8"?>
+<p:tagLst xmlns:p="http://schemas.openxmlformats.org/presentationml/2006/main">
+  <p:tag name="KSO_WM_BEAUTIFY_FLAG" val=""/>
+</p:tagLst>
+</file>
+
+<file path=ppt/tags/tag21.xml><?xml version="1.0" encoding="utf-8"?>
+<p:tagLst xmlns:p="http://schemas.openxmlformats.org/presentationml/2006/main">
+  <p:tag name="KSO_WM_BEAUTIFY_FLAG" val=""/>
+</p:tagLst>
+</file>
+
+<file path=ppt/tags/tag22.xml><?xml version="1.0" encoding="utf-8"?>
+<p:tagLst xmlns:p="http://schemas.openxmlformats.org/presentationml/2006/main">
+  <p:tag name="KSO_WM_BEAUTIFY_FLAG" val=""/>
+</p:tagLst>
+</file>
+
+<file path=ppt/tags/tag23.xml><?xml version="1.0" encoding="utf-8"?>
+<p:tagLst xmlns:p="http://schemas.openxmlformats.org/presentationml/2006/main">
+  <p:tag name="KSO_WM_BEAUTIFY_FLAG" val=""/>
+</p:tagLst>
+</file>
+
+<file path=ppt/tags/tag24.xml><?xml version="1.0" encoding="utf-8"?>
+<p:tagLst xmlns:p="http://schemas.openxmlformats.org/presentationml/2006/main">
+  <p:tag name="KSO_WM_BEAUTIFY_FLAG" val=""/>
+</p:tagLst>
+</file>
+
+<file path=ppt/tags/tag25.xml><?xml version="1.0" encoding="utf-8"?>
+<p:tagLst xmlns:p="http://schemas.openxmlformats.org/presentationml/2006/main">
+  <p:tag name="KSO_WM_BEAUTIFY_FLAG" val=""/>
+</p:tagLst>
+</file>
+
+<file path=ppt/tags/tag26.xml><?xml version="1.0" encoding="utf-8"?>
+<p:tagLst xmlns:p="http://schemas.openxmlformats.org/presentationml/2006/main">
+  <p:tag name="KSO_WM_BEAUTIFY_FLAG" val=""/>
+</p:tagLst>
+</file>
+
+<file path=ppt/tags/tag27.xml><?xml version="1.0" encoding="utf-8"?>
+<p:tagLst xmlns:p="http://schemas.openxmlformats.org/presentationml/2006/main">
+  <p:tag name="KSO_WM_BEAUTIFY_FLAG" val=""/>
+</p:tagLst>
+</file>
+
+<file path=ppt/tags/tag28.xml><?xml version="1.0" encoding="utf-8"?>
+<p:tagLst xmlns:p="http://schemas.openxmlformats.org/presentationml/2006/main">
+  <p:tag name="KSO_WM_BEAUTIFY_FLAG" val=""/>
+</p:tagLst>
+</file>
+
+<file path=ppt/tags/tag29.xml><?xml version="1.0" encoding="utf-8"?>
 <p:tagLst xmlns:p="http://schemas.openxmlformats.org/presentationml/2006/main">
   <p:tag name="KSO_WM_BEAUTIFY_FLAG" val=""/>
 </p:tagLst>
@@ -4749,7 +6503,85 @@
 </p:tagLst>
 </file>
 
+<file path=ppt/tags/tag30.xml><?xml version="1.0" encoding="utf-8"?>
+<p:tagLst xmlns:p="http://schemas.openxmlformats.org/presentationml/2006/main">
+  <p:tag name="KSO_WM_BEAUTIFY_FLAG" val=""/>
+</p:tagLst>
+</file>
+
+<file path=ppt/tags/tag31.xml><?xml version="1.0" encoding="utf-8"?>
+<p:tagLst xmlns:p="http://schemas.openxmlformats.org/presentationml/2006/main">
+  <p:tag name="KSO_WM_BEAUTIFY_FLAG" val=""/>
+</p:tagLst>
+</file>
+
+<file path=ppt/tags/tag32.xml><?xml version="1.0" encoding="utf-8"?>
+<p:tagLst xmlns:p="http://schemas.openxmlformats.org/presentationml/2006/main">
+  <p:tag name="KSO_WM_BEAUTIFY_FLAG" val=""/>
+</p:tagLst>
+</file>
+
+<file path=ppt/tags/tag33.xml><?xml version="1.0" encoding="utf-8"?>
+<p:tagLst xmlns:p="http://schemas.openxmlformats.org/presentationml/2006/main">
+  <p:tag name="KSO_WM_BEAUTIFY_FLAG" val=""/>
+</p:tagLst>
+</file>
+
+<file path=ppt/tags/tag34.xml><?xml version="1.0" encoding="utf-8"?>
+<p:tagLst xmlns:p="http://schemas.openxmlformats.org/presentationml/2006/main">
+  <p:tag name="KSO_WM_BEAUTIFY_FLAG" val=""/>
+</p:tagLst>
+</file>
+
+<file path=ppt/tags/tag35.xml><?xml version="1.0" encoding="utf-8"?>
+<p:tagLst xmlns:p="http://schemas.openxmlformats.org/presentationml/2006/main">
+  <p:tag name="KSO_WM_BEAUTIFY_FLAG" val=""/>
+</p:tagLst>
+</file>
+
+<file path=ppt/tags/tag36.xml><?xml version="1.0" encoding="utf-8"?>
+<p:tagLst xmlns:p="http://schemas.openxmlformats.org/presentationml/2006/main">
+  <p:tag name="KSO_WM_BEAUTIFY_FLAG" val=""/>
+</p:tagLst>
+</file>
+
+<file path=ppt/tags/tag37.xml><?xml version="1.0" encoding="utf-8"?>
+<p:tagLst xmlns:p="http://schemas.openxmlformats.org/presentationml/2006/main">
+  <p:tag name="KSO_WM_BEAUTIFY_FLAG" val=""/>
+</p:tagLst>
+</file>
+
+<file path=ppt/tags/tag38.xml><?xml version="1.0" encoding="utf-8"?>
+<p:tagLst xmlns:p="http://schemas.openxmlformats.org/presentationml/2006/main">
+  <p:tag name="KSO_WM_BEAUTIFY_FLAG" val=""/>
+</p:tagLst>
+</file>
+
+<file path=ppt/tags/tag39.xml><?xml version="1.0" encoding="utf-8"?>
+<p:tagLst xmlns:p="http://schemas.openxmlformats.org/presentationml/2006/main">
+  <p:tag name="KSO_WM_BEAUTIFY_FLAG" val=""/>
+</p:tagLst>
+</file>
+
 <file path=ppt/tags/tag4.xml><?xml version="1.0" encoding="utf-8"?>
+<p:tagLst xmlns:p="http://schemas.openxmlformats.org/presentationml/2006/main">
+  <p:tag name="KSO_WM_BEAUTIFY_FLAG" val=""/>
+</p:tagLst>
+</file>
+
+<file path=ppt/tags/tag40.xml><?xml version="1.0" encoding="utf-8"?>
+<p:tagLst xmlns:p="http://schemas.openxmlformats.org/presentationml/2006/main">
+  <p:tag name="KSO_WM_BEAUTIFY_FLAG" val=""/>
+</p:tagLst>
+</file>
+
+<file path=ppt/tags/tag41.xml><?xml version="1.0" encoding="utf-8"?>
+<p:tagLst xmlns:p="http://schemas.openxmlformats.org/presentationml/2006/main">
+  <p:tag name="KSO_WM_BEAUTIFY_FLAG" val=""/>
+</p:tagLst>
+</file>
+
+<file path=ppt/tags/tag42.xml><?xml version="1.0" encoding="utf-8"?>
 <p:tagLst xmlns:p="http://schemas.openxmlformats.org/presentationml/2006/main">
   <p:tag name="KSO_WM_BEAUTIFY_FLAG" val=""/>
 </p:tagLst>

</xml_diff>

<commit_message>
update_Language Models are Unsupervised Multitask Learners
</commit_message>
<xml_diff>
--- a/Base_Model/LLM/论文插图.pptx
+++ b/Base_Model/LLM/论文插图.pptx
@@ -8,13 +8,15 @@
     <p:notesMasterId r:id="rId4"/>
   </p:notesMasterIdLst>
   <p:handoutMasterIdLst>
-    <p:handoutMasterId r:id="rId8"/>
+    <p:handoutMasterId r:id="rId10"/>
   </p:handoutMasterIdLst>
   <p:sldIdLst>
     <p:sldId id="256" r:id="rId3"/>
     <p:sldId id="257" r:id="rId5"/>
     <p:sldId id="258" r:id="rId6"/>
     <p:sldId id="259" r:id="rId7"/>
+    <p:sldId id="260" r:id="rId8"/>
+    <p:sldId id="261" r:id="rId9"/>
   </p:sldIdLst>
   <p:sldSz cx="12192000" cy="6858000"/>
   <p:notesSz cx="7103745" cy="10234295"/>
@@ -121,7 +123,7 @@
             <a:srgbClr val="A4A3A4"/>
           </p15:clr>
         </p15:guide>
-        <p15:guide id="2" pos="3864" userDrawn="1">
+        <p15:guide id="2" pos="3840" userDrawn="1">
           <p15:clr>
             <a:srgbClr val="A4A3A4"/>
           </p15:clr>
@@ -5137,7 +5139,7 @@
         </p:blipFill>
         <p:spPr>
           <a:xfrm>
-            <a:off x="135255" y="305435"/>
+            <a:off x="78740" y="423545"/>
             <a:ext cx="10755630" cy="4464685"/>
           </a:xfrm>
           <a:prstGeom prst="rect">
@@ -6350,6 +6352,402 @@
               <a:t>相邻</a:t>
             </a:r>
             <a:endParaRPr lang="zh-CN" altLang="en-US" sz="1200" b="1">
+              <a:latin typeface="微软雅黑" charset="0"/>
+              <a:ea typeface="微软雅黑" charset="0"/>
+              <a:cs typeface="微软雅黑" charset="0"/>
+            </a:endParaRPr>
+          </a:p>
+        </p:txBody>
+      </p:sp>
+    </p:spTree>
+  </p:cSld>
+  <p:clrMapOvr>
+    <a:masterClrMapping/>
+  </p:clrMapOvr>
+</p:sld>
+</file>
+
+<file path=ppt/slides/slide5.xml><?xml version="1.0" encoding="utf-8"?>
+<p:sld xmlns:a="http://schemas.openxmlformats.org/drawingml/2006/main" xmlns:r="http://schemas.openxmlformats.org/officeDocument/2006/relationships" xmlns:p="http://schemas.openxmlformats.org/presentationml/2006/main">
+  <p:cSld>
+    <p:spTree>
+      <p:nvGrpSpPr>
+        <p:cNvPr id="1" name=""/>
+        <p:cNvGrpSpPr/>
+        <p:nvPr/>
+      </p:nvGrpSpPr>
+      <p:grpSpPr/>
+      <p:sp>
+        <p:nvSpPr>
+          <p:cNvPr id="2" name="标题 1"/>
+          <p:cNvSpPr>
+            <a:spLocks noGrp="1"/>
+          </p:cNvSpPr>
+          <p:nvPr>
+            <p:ph type="ctrTitle"/>
+          </p:nvPr>
+        </p:nvSpPr>
+        <p:spPr/>
+        <p:txBody>
+          <a:bodyPr/>
+          <a:p>
+            <a:r>
+              <a:rPr lang="en-US" altLang="zh-CN"/>
+              <a:t>GPT-2</a:t>
+            </a:r>
+            <a:endParaRPr lang="en-US" altLang="zh-CN"/>
+          </a:p>
+        </p:txBody>
+      </p:sp>
+      <p:sp>
+        <p:nvSpPr>
+          <p:cNvPr id="3" name="副标题 2"/>
+          <p:cNvSpPr>
+            <a:spLocks noGrp="1"/>
+          </p:cNvSpPr>
+          <p:nvPr>
+            <p:ph type="subTitle" idx="1"/>
+          </p:nvPr>
+        </p:nvSpPr>
+        <p:spPr/>
+        <p:txBody>
+          <a:bodyPr/>
+          <a:p>
+            <a:endParaRPr lang="zh-CN" altLang="en-US"/>
+          </a:p>
+        </p:txBody>
+      </p:sp>
+    </p:spTree>
+  </p:cSld>
+  <p:clrMapOvr>
+    <a:masterClrMapping/>
+  </p:clrMapOvr>
+</p:sld>
+</file>
+
+<file path=ppt/slides/slide6.xml><?xml version="1.0" encoding="utf-8"?>
+<p:sld xmlns:a="http://schemas.openxmlformats.org/drawingml/2006/main" xmlns:r="http://schemas.openxmlformats.org/officeDocument/2006/relationships" xmlns:p="http://schemas.openxmlformats.org/presentationml/2006/main">
+  <p:cSld>
+    <p:spTree>
+      <p:nvGrpSpPr>
+        <p:cNvPr id="1" name=""/>
+        <p:cNvGrpSpPr/>
+        <p:nvPr/>
+      </p:nvGrpSpPr>
+      <p:grpSpPr/>
+      <p:pic>
+        <p:nvPicPr>
+          <p:cNvPr id="4" name="图片 3"/>
+          <p:cNvPicPr>
+            <a:picLocks noChangeAspect="1"/>
+          </p:cNvPicPr>
+          <p:nvPr>
+            <p:custDataLst>
+              <p:tags r:id="rId1"/>
+            </p:custDataLst>
+          </p:nvPr>
+        </p:nvPicPr>
+        <p:blipFill>
+          <a:blip r:embed="rId2"/>
+          <a:stretch>
+            <a:fillRect/>
+          </a:stretch>
+        </p:blipFill>
+        <p:spPr>
+          <a:xfrm>
+            <a:off x="857250" y="1873250"/>
+            <a:ext cx="10477500" cy="3111500"/>
+          </a:xfrm>
+          <a:prstGeom prst="rect">
+            <a:avLst/>
+          </a:prstGeom>
+        </p:spPr>
+      </p:pic>
+      <p:sp>
+        <p:nvSpPr>
+          <p:cNvPr id="9" name="文本框 8"/>
+          <p:cNvSpPr txBox="1"/>
+          <p:nvPr>
+            <p:custDataLst>
+              <p:tags r:id="rId3"/>
+            </p:custDataLst>
+          </p:nvPr>
+        </p:nvSpPr>
+        <p:spPr>
+          <a:xfrm>
+            <a:off x="759460" y="1676400"/>
+            <a:ext cx="3195320" cy="389255"/>
+          </a:xfrm>
+          <a:prstGeom prst="rect">
+            <a:avLst/>
+          </a:prstGeom>
+          <a:noFill/>
+        </p:spPr>
+        <p:txBody>
+          <a:bodyPr wrap="square" rtlCol="0">
+            <a:noAutofit/>
+          </a:bodyPr>
+          <a:p>
+            <a:pPr algn="ctr"/>
+            <a:r>
+              <a:rPr lang="zh-CN" altLang="en-US" sz="1200" b="1">
+                <a:latin typeface="微软雅黑" charset="0"/>
+                <a:ea typeface="微软雅黑" charset="0"/>
+                <a:cs typeface="微软雅黑" charset="0"/>
+              </a:rPr>
+              <a:t>阅读理解</a:t>
+            </a:r>
+            <a:r>
+              <a:rPr lang="zh-CN" altLang="en-US" sz="1200" b="1">
+                <a:latin typeface="微软雅黑" charset="0"/>
+                <a:ea typeface="微软雅黑" charset="0"/>
+                <a:cs typeface="微软雅黑" charset="0"/>
+              </a:rPr>
+              <a:t>任务</a:t>
+            </a:r>
+            <a:endParaRPr lang="zh-CN" altLang="en-US" sz="1200" b="1">
+              <a:latin typeface="微软雅黑" charset="0"/>
+              <a:ea typeface="微软雅黑" charset="0"/>
+              <a:cs typeface="微软雅黑" charset="0"/>
+            </a:endParaRPr>
+          </a:p>
+        </p:txBody>
+      </p:sp>
+      <p:sp>
+        <p:nvSpPr>
+          <p:cNvPr id="5" name="文本框 4"/>
+          <p:cNvSpPr txBox="1"/>
+          <p:nvPr>
+            <p:custDataLst>
+              <p:tags r:id="rId4"/>
+            </p:custDataLst>
+          </p:nvPr>
+        </p:nvSpPr>
+        <p:spPr>
+          <a:xfrm>
+            <a:off x="3404870" y="1676400"/>
+            <a:ext cx="3195320" cy="389255"/>
+          </a:xfrm>
+          <a:prstGeom prst="rect">
+            <a:avLst/>
+          </a:prstGeom>
+          <a:noFill/>
+        </p:spPr>
+        <p:txBody>
+          <a:bodyPr wrap="square" rtlCol="0">
+            <a:noAutofit/>
+          </a:bodyPr>
+          <a:p>
+            <a:pPr algn="ctr"/>
+            <a:r>
+              <a:rPr lang="zh-CN" altLang="en-US" sz="1200" b="1">
+                <a:latin typeface="微软雅黑" charset="0"/>
+                <a:ea typeface="微软雅黑" charset="0"/>
+                <a:cs typeface="微软雅黑" charset="0"/>
+              </a:rPr>
+              <a:t>翻译任务</a:t>
+            </a:r>
+            <a:endParaRPr lang="zh-CN" altLang="en-US" sz="1200" b="1">
+              <a:latin typeface="微软雅黑" charset="0"/>
+              <a:ea typeface="微软雅黑" charset="0"/>
+              <a:cs typeface="微软雅黑" charset="0"/>
+            </a:endParaRPr>
+          </a:p>
+        </p:txBody>
+      </p:sp>
+      <p:sp>
+        <p:nvSpPr>
+          <p:cNvPr id="6" name="文本框 5"/>
+          <p:cNvSpPr txBox="1"/>
+          <p:nvPr>
+            <p:custDataLst>
+              <p:tags r:id="rId5"/>
+            </p:custDataLst>
+          </p:nvPr>
+        </p:nvSpPr>
+        <p:spPr>
+          <a:xfrm>
+            <a:off x="5818505" y="1676400"/>
+            <a:ext cx="3195320" cy="389255"/>
+          </a:xfrm>
+          <a:prstGeom prst="rect">
+            <a:avLst/>
+          </a:prstGeom>
+          <a:noFill/>
+        </p:spPr>
+        <p:txBody>
+          <a:bodyPr wrap="square" rtlCol="0">
+            <a:noAutofit/>
+          </a:bodyPr>
+          <a:p>
+            <a:pPr algn="ctr"/>
+            <a:r>
+              <a:rPr lang="zh-CN" altLang="en-US" sz="1200" b="1">
+                <a:latin typeface="微软雅黑" charset="0"/>
+                <a:ea typeface="微软雅黑" charset="0"/>
+                <a:cs typeface="微软雅黑" charset="0"/>
+              </a:rPr>
+              <a:t>摘要</a:t>
+            </a:r>
+            <a:r>
+              <a:rPr lang="zh-CN" altLang="en-US" sz="1200" b="1">
+                <a:latin typeface="微软雅黑" charset="0"/>
+                <a:ea typeface="微软雅黑" charset="0"/>
+                <a:cs typeface="微软雅黑" charset="0"/>
+              </a:rPr>
+              <a:t>生成任务</a:t>
+            </a:r>
+            <a:endParaRPr lang="zh-CN" altLang="en-US" sz="1200" b="1">
+              <a:latin typeface="微软雅黑" charset="0"/>
+              <a:ea typeface="微软雅黑" charset="0"/>
+              <a:cs typeface="微软雅黑" charset="0"/>
+            </a:endParaRPr>
+          </a:p>
+        </p:txBody>
+      </p:sp>
+      <p:sp>
+        <p:nvSpPr>
+          <p:cNvPr id="7" name="文本框 6"/>
+          <p:cNvSpPr txBox="1"/>
+          <p:nvPr>
+            <p:custDataLst>
+              <p:tags r:id="rId6"/>
+            </p:custDataLst>
+          </p:nvPr>
+        </p:nvSpPr>
+        <p:spPr>
+          <a:xfrm>
+            <a:off x="8390890" y="1676400"/>
+            <a:ext cx="3195320" cy="389255"/>
+          </a:xfrm>
+          <a:prstGeom prst="rect">
+            <a:avLst/>
+          </a:prstGeom>
+          <a:noFill/>
+        </p:spPr>
+        <p:txBody>
+          <a:bodyPr wrap="square" rtlCol="0">
+            <a:noAutofit/>
+          </a:bodyPr>
+          <a:p>
+            <a:pPr algn="ctr"/>
+            <a:r>
+              <a:rPr lang="zh-CN" altLang="en-US" sz="1200" b="1">
+                <a:latin typeface="微软雅黑" charset="0"/>
+                <a:ea typeface="微软雅黑" charset="0"/>
+                <a:cs typeface="微软雅黑" charset="0"/>
+              </a:rPr>
+              <a:t>开放</a:t>
+            </a:r>
+            <a:r>
+              <a:rPr lang="zh-CN" altLang="en-US" sz="1200" b="1">
+                <a:latin typeface="微软雅黑" charset="0"/>
+                <a:ea typeface="微软雅黑" charset="0"/>
+                <a:cs typeface="微软雅黑" charset="0"/>
+              </a:rPr>
+              <a:t>域任务</a:t>
+            </a:r>
+            <a:endParaRPr lang="zh-CN" altLang="en-US" sz="1200" b="1">
+              <a:latin typeface="微软雅黑" charset="0"/>
+              <a:ea typeface="微软雅黑" charset="0"/>
+              <a:cs typeface="微软雅黑" charset="0"/>
+            </a:endParaRPr>
+          </a:p>
+        </p:txBody>
+      </p:sp>
+      <p:sp>
+        <p:nvSpPr>
+          <p:cNvPr id="8" name="文本框 7"/>
+          <p:cNvSpPr txBox="1"/>
+          <p:nvPr>
+            <p:custDataLst>
+              <p:tags r:id="rId7"/>
+            </p:custDataLst>
+          </p:nvPr>
+        </p:nvSpPr>
+        <p:spPr>
+          <a:xfrm>
+            <a:off x="3630295" y="434340"/>
+            <a:ext cx="4931410" cy="389255"/>
+          </a:xfrm>
+          <a:prstGeom prst="rect">
+            <a:avLst/>
+          </a:prstGeom>
+          <a:noFill/>
+        </p:spPr>
+        <p:txBody>
+          <a:bodyPr wrap="square" rtlCol="0">
+            <a:noAutofit/>
+          </a:bodyPr>
+          <a:p>
+            <a:pPr algn="ctr"/>
+            <a:r>
+              <a:rPr lang="en-US" altLang="zh-CN" sz="2000" b="1">
+                <a:latin typeface="微软雅黑" charset="0"/>
+                <a:ea typeface="微软雅黑" charset="0"/>
+                <a:cs typeface="微软雅黑" charset="0"/>
+              </a:rPr>
+              <a:t>Zero-shot</a:t>
+            </a:r>
+            <a:r>
+              <a:rPr lang="zh-CN" altLang="en-US" sz="2000" b="1">
+                <a:latin typeface="微软雅黑" charset="0"/>
+                <a:ea typeface="微软雅黑" charset="0"/>
+                <a:cs typeface="微软雅黑" charset="0"/>
+              </a:rPr>
+              <a:t>模型尺寸与性能评估</a:t>
+            </a:r>
+            <a:endParaRPr lang="zh-CN" altLang="en-US" sz="2000" b="1">
+              <a:latin typeface="微软雅黑" charset="0"/>
+              <a:ea typeface="微软雅黑" charset="0"/>
+              <a:cs typeface="微软雅黑" charset="0"/>
+            </a:endParaRPr>
+          </a:p>
+        </p:txBody>
+      </p:sp>
+      <p:sp>
+        <p:nvSpPr>
+          <p:cNvPr id="10" name="文本框 9"/>
+          <p:cNvSpPr txBox="1"/>
+          <p:nvPr>
+            <p:custDataLst>
+              <p:tags r:id="rId8"/>
+            </p:custDataLst>
+          </p:nvPr>
+        </p:nvSpPr>
+        <p:spPr>
+          <a:xfrm>
+            <a:off x="3093085" y="5683885"/>
+            <a:ext cx="5664200" cy="389255"/>
+          </a:xfrm>
+          <a:prstGeom prst="rect">
+            <a:avLst/>
+          </a:prstGeom>
+          <a:noFill/>
+        </p:spPr>
+        <p:txBody>
+          <a:bodyPr wrap="square" rtlCol="0">
+            <a:noAutofit/>
+          </a:bodyPr>
+          <a:p>
+            <a:pPr algn="ctr"/>
+            <a:r>
+              <a:rPr lang="zh-CN" altLang="en-US" sz="2000" b="1">
+                <a:latin typeface="微软雅黑" charset="0"/>
+                <a:ea typeface="微软雅黑" charset="0"/>
+                <a:cs typeface="微软雅黑" charset="0"/>
+              </a:rPr>
+              <a:t>模型越大性能越好，且目前没有触碰到</a:t>
+            </a:r>
+            <a:r>
+              <a:rPr lang="zh-CN" altLang="en-US" sz="2000" b="1">
+                <a:latin typeface="微软雅黑" charset="0"/>
+                <a:ea typeface="微软雅黑" charset="0"/>
+                <a:cs typeface="微软雅黑" charset="0"/>
+              </a:rPr>
+              <a:t>上限</a:t>
+            </a:r>
+            <a:endParaRPr lang="zh-CN" altLang="en-US" sz="2000" b="1">
               <a:latin typeface="微软雅黑" charset="0"/>
               <a:ea typeface="微软雅黑" charset="0"/>
               <a:cs typeface="微软雅黑" charset="0"/>
@@ -6582,6 +6980,48 @@
 </file>
 
 <file path=ppt/tags/tag42.xml><?xml version="1.0" encoding="utf-8"?>
+<p:tagLst xmlns:p="http://schemas.openxmlformats.org/presentationml/2006/main">
+  <p:tag name="KSO_WM_BEAUTIFY_FLAG" val=""/>
+</p:tagLst>
+</file>
+
+<file path=ppt/tags/tag43.xml><?xml version="1.0" encoding="utf-8"?>
+<p:tagLst xmlns:p="http://schemas.openxmlformats.org/presentationml/2006/main">
+  <p:tag name="KSO_WM_BEAUTIFY_FLAG" val=""/>
+</p:tagLst>
+</file>
+
+<file path=ppt/tags/tag44.xml><?xml version="1.0" encoding="utf-8"?>
+<p:tagLst xmlns:p="http://schemas.openxmlformats.org/presentationml/2006/main">
+  <p:tag name="KSO_WM_BEAUTIFY_FLAG" val=""/>
+</p:tagLst>
+</file>
+
+<file path=ppt/tags/tag45.xml><?xml version="1.0" encoding="utf-8"?>
+<p:tagLst xmlns:p="http://schemas.openxmlformats.org/presentationml/2006/main">
+  <p:tag name="KSO_WM_BEAUTIFY_FLAG" val=""/>
+</p:tagLst>
+</file>
+
+<file path=ppt/tags/tag46.xml><?xml version="1.0" encoding="utf-8"?>
+<p:tagLst xmlns:p="http://schemas.openxmlformats.org/presentationml/2006/main">
+  <p:tag name="KSO_WM_BEAUTIFY_FLAG" val=""/>
+</p:tagLst>
+</file>
+
+<file path=ppt/tags/tag47.xml><?xml version="1.0" encoding="utf-8"?>
+<p:tagLst xmlns:p="http://schemas.openxmlformats.org/presentationml/2006/main">
+  <p:tag name="KSO_WM_BEAUTIFY_FLAG" val=""/>
+</p:tagLst>
+</file>
+
+<file path=ppt/tags/tag48.xml><?xml version="1.0" encoding="utf-8"?>
+<p:tagLst xmlns:p="http://schemas.openxmlformats.org/presentationml/2006/main">
+  <p:tag name="KSO_WM_BEAUTIFY_FLAG" val=""/>
+</p:tagLst>
+</file>
+
+<file path=ppt/tags/tag49.xml><?xml version="1.0" encoding="utf-8"?>
 <p:tagLst xmlns:p="http://schemas.openxmlformats.org/presentationml/2006/main">
   <p:tag name="KSO_WM_BEAUTIFY_FLAG" val=""/>
 </p:tagLst>

</xml_diff>